<commit_message>
Dodanie projektu z pycharm
</commit_message>
<xml_diff>
--- a/Prezentacja_Projekt_zesolowy.pptx
+++ b/Prezentacja_Projekt_zesolowy.pptx
@@ -18901,7 +18901,7 @@
           <a:p>
             <a:fld id="{6989806E-8E94-473C-AEE7-BE6F15F85533}" type="datetime1">
               <a:rPr lang="en-US" smtClean="0"/>
-              <a:t>4/28/2023</a:t>
+              <a:t>4/29/2023</a:t>
             </a:fld>
             <a:endParaRPr lang="en-US" dirty="0"/>
           </a:p>
@@ -19170,7 +19170,7 @@
           <a:p>
             <a:fld id="{6989806E-8E94-473C-AEE7-BE6F15F85533}" type="datetime1">
               <a:rPr lang="en-US" smtClean="0"/>
-              <a:t>4/28/2023</a:t>
+              <a:t>4/29/2023</a:t>
             </a:fld>
             <a:endParaRPr lang="en-US" dirty="0"/>
           </a:p>
@@ -19403,7 +19403,7 @@
           <a:p>
             <a:fld id="{6989806E-8E94-473C-AEE7-BE6F15F85533}" type="datetime1">
               <a:rPr lang="en-US" smtClean="0"/>
-              <a:t>4/28/2023</a:t>
+              <a:t>4/29/2023</a:t>
             </a:fld>
             <a:endParaRPr lang="en-US" dirty="0"/>
           </a:p>
@@ -19715,7 +19715,7 @@
           <a:p>
             <a:fld id="{6989806E-8E94-473C-AEE7-BE6F15F85533}" type="datetime1">
               <a:rPr lang="en-US" smtClean="0"/>
-              <a:t>4/28/2023</a:t>
+              <a:t>4/29/2023</a:t>
             </a:fld>
             <a:endParaRPr lang="en-US" dirty="0"/>
           </a:p>
@@ -20190,7 +20190,7 @@
           <a:p>
             <a:fld id="{6989806E-8E94-473C-AEE7-BE6F15F85533}" type="datetime1">
               <a:rPr lang="en-US" smtClean="0"/>
-              <a:t>4/28/2023</a:t>
+              <a:t>4/29/2023</a:t>
             </a:fld>
             <a:endParaRPr lang="en-US" dirty="0"/>
           </a:p>
@@ -20739,7 +20739,7 @@
           <a:p>
             <a:fld id="{6989806E-8E94-473C-AEE7-BE6F15F85533}" type="datetime1">
               <a:rPr lang="en-US" smtClean="0"/>
-              <a:t>4/28/2023</a:t>
+              <a:t>4/29/2023</a:t>
             </a:fld>
             <a:endParaRPr lang="en-US" dirty="0"/>
           </a:p>
@@ -21515,7 +21515,7 @@
           <a:p>
             <a:fld id="{6989806E-8E94-473C-AEE7-BE6F15F85533}" type="datetime1">
               <a:rPr lang="en-US" smtClean="0"/>
-              <a:t>4/28/2023</a:t>
+              <a:t>4/29/2023</a:t>
             </a:fld>
             <a:endParaRPr lang="en-US" dirty="0"/>
           </a:p>
@@ -21692,7 +21692,7 @@
           <a:p>
             <a:fld id="{6989806E-8E94-473C-AEE7-BE6F15F85533}" type="datetime1">
               <a:rPr lang="en-US" smtClean="0"/>
-              <a:t>4/28/2023</a:t>
+              <a:t>4/29/2023</a:t>
             </a:fld>
             <a:endParaRPr lang="en-US" dirty="0"/>
           </a:p>
@@ -21917,7 +21917,7 @@
           <a:p>
             <a:fld id="{6989806E-8E94-473C-AEE7-BE6F15F85533}" type="datetime1">
               <a:rPr lang="en-US" smtClean="0"/>
-              <a:t>4/28/2023</a:t>
+              <a:t>4/29/2023</a:t>
             </a:fld>
             <a:endParaRPr lang="en-US" dirty="0"/>
           </a:p>
@@ -22099,7 +22099,7 @@
           <a:p>
             <a:fld id="{6989806E-8E94-473C-AEE7-BE6F15F85533}" type="datetime1">
               <a:rPr lang="en-US" smtClean="0"/>
-              <a:t>4/28/2023</a:t>
+              <a:t>4/29/2023</a:t>
             </a:fld>
             <a:endParaRPr lang="en-US" dirty="0"/>
           </a:p>
@@ -22390,7 +22390,7 @@
           <a:p>
             <a:fld id="{6989806E-8E94-473C-AEE7-BE6F15F85533}" type="datetime1">
               <a:rPr lang="en-US" smtClean="0"/>
-              <a:t>4/28/2023</a:t>
+              <a:t>4/29/2023</a:t>
             </a:fld>
             <a:endParaRPr lang="en-US" dirty="0"/>
           </a:p>
@@ -22634,7 +22634,7 @@
           <a:p>
             <a:fld id="{6989806E-8E94-473C-AEE7-BE6F15F85533}" type="datetime1">
               <a:rPr lang="en-US" smtClean="0"/>
-              <a:t>4/28/2023</a:t>
+              <a:t>4/29/2023</a:t>
             </a:fld>
             <a:endParaRPr lang="en-US" dirty="0"/>
           </a:p>
@@ -23015,7 +23015,7 @@
           <a:p>
             <a:fld id="{6989806E-8E94-473C-AEE7-BE6F15F85533}" type="datetime1">
               <a:rPr lang="en-US" smtClean="0"/>
-              <a:t>4/28/2023</a:t>
+              <a:t>4/29/2023</a:t>
             </a:fld>
             <a:endParaRPr lang="en-US" dirty="0"/>
           </a:p>
@@ -23135,7 +23135,7 @@
           <a:p>
             <a:fld id="{6989806E-8E94-473C-AEE7-BE6F15F85533}" type="datetime1">
               <a:rPr lang="en-US" smtClean="0"/>
-              <a:t>4/28/2023</a:t>
+              <a:t>4/29/2023</a:t>
             </a:fld>
             <a:endParaRPr lang="en-US" dirty="0"/>
           </a:p>
@@ -23232,7 +23232,7 @@
           <a:p>
             <a:fld id="{6989806E-8E94-473C-AEE7-BE6F15F85533}" type="datetime1">
               <a:rPr lang="en-US" smtClean="0"/>
-              <a:t>4/28/2023</a:t>
+              <a:t>4/29/2023</a:t>
             </a:fld>
             <a:endParaRPr lang="en-US" dirty="0"/>
           </a:p>
@@ -23483,7 +23483,7 @@
           <a:p>
             <a:fld id="{6989806E-8E94-473C-AEE7-BE6F15F85533}" type="datetime1">
               <a:rPr lang="en-US" smtClean="0"/>
-              <a:t>4/28/2023</a:t>
+              <a:t>4/29/2023</a:t>
             </a:fld>
             <a:endParaRPr lang="en-US" dirty="0"/>
           </a:p>
@@ -23742,7 +23742,7 @@
           <a:p>
             <a:fld id="{6989806E-8E94-473C-AEE7-BE6F15F85533}" type="datetime1">
               <a:rPr lang="en-US" smtClean="0"/>
-              <a:t>4/28/2023</a:t>
+              <a:t>4/29/2023</a:t>
             </a:fld>
             <a:endParaRPr lang="en-US" dirty="0"/>
           </a:p>
@@ -23987,7 +23987,7 @@
           <a:p>
             <a:fld id="{6989806E-8E94-473C-AEE7-BE6F15F85533}" type="datetime1">
               <a:rPr lang="en-US" smtClean="0"/>
-              <a:t>4/28/2023</a:t>
+              <a:t>4/29/2023</a:t>
             </a:fld>
             <a:endParaRPr lang="en-US" dirty="0"/>
           </a:p>
@@ -27516,8 +27516,8 @@
               <a:buChar char="Ø"/>
             </a:pPr>
             <a:r>
-              <a:rPr lang="pl-PL" sz="2400" dirty="0"/>
-              <a:t>https://github.com/NeKoriVIII/projekt_zespolowy</a:t>
+              <a:rPr lang="pl-PL" sz="2400"/>
+              <a:t>https://github.com/NeKoriVIII/ProjektZespolowyV2/tree/master</a:t>
             </a:r>
             <a:endParaRPr lang="ru-RU" sz="2400" dirty="0"/>
           </a:p>

</xml_diff>